<commit_message>
update README and add goals/outcomes to slide deck 0
</commit_message>
<xml_diff>
--- a/presentations/0-Workshop-Kickoff.pptx
+++ b/presentations/0-Workshop-Kickoff.pptx
@@ -5,16 +5,18 @@
     <p:sldMasterId id="2147493455" r:id="rId4"/>
   </p:sldMasterIdLst>
   <p:notesMasterIdLst>
-    <p:notesMasterId r:id="rId12"/>
+    <p:notesMasterId r:id="rId14"/>
   </p:notesMasterIdLst>
   <p:sldIdLst>
     <p:sldId id="326" r:id="rId5"/>
     <p:sldId id="321" r:id="rId6"/>
     <p:sldId id="320" r:id="rId7"/>
     <p:sldId id="324" r:id="rId8"/>
-    <p:sldId id="294" r:id="rId9"/>
-    <p:sldId id="328" r:id="rId10"/>
-    <p:sldId id="329" r:id="rId11"/>
+    <p:sldId id="330" r:id="rId9"/>
+    <p:sldId id="331" r:id="rId10"/>
+    <p:sldId id="294" r:id="rId11"/>
+    <p:sldId id="328" r:id="rId12"/>
+    <p:sldId id="329" r:id="rId13"/>
   </p:sldIdLst>
   <p:sldSz cx="9144000" cy="5143500" type="screen16x9"/>
   <p:notesSz cx="6858000" cy="9144000"/>
@@ -662,7 +664,7 @@
           <a:p>
             <a:fld id="{19B87A38-3CEC-41F8-9B8A-7D549F200228}" type="slidenum">
               <a:rPr lang="en-US" smtClean="0"/>
-              <a:t>5</a:t>
+              <a:t>7</a:t>
             </a:fld>
             <a:endParaRPr lang="en-US"/>
           </a:p>
@@ -784,7 +786,7 @@
                 <a:latin typeface="Calibri"/>
               </a:rPr>
               <a:pPr/>
-              <a:t>6</a:t>
+              <a:t>8</a:t>
             </a:fld>
             <a:endParaRPr lang="en-US">
               <a:solidFill>
@@ -8488,6 +8490,244 @@
           <a:p>
             <a:r>
               <a:rPr lang="en-US" dirty="0" smtClean="0"/>
+              <a:t>Workshop, Goals</a:t>
+            </a:r>
+            <a:endParaRPr lang="en-US" dirty="0"/>
+          </a:p>
+        </p:txBody>
+      </p:sp>
+      <p:sp>
+        <p:nvSpPr>
+          <p:cNvPr id="3" name="Content Placeholder 2"/>
+          <p:cNvSpPr>
+            <a:spLocks noGrp="1"/>
+          </p:cNvSpPr>
+          <p:nvPr>
+            <p:ph sz="quarter" idx="10"/>
+          </p:nvPr>
+        </p:nvSpPr>
+        <p:spPr/>
+        <p:txBody>
+          <a:bodyPr>
+            <a:normAutofit fontScale="92500" lnSpcReduction="10000"/>
+          </a:bodyPr>
+          <a:lstStyle/>
+          <a:p>
+            <a:r>
+              <a:rPr lang="en-US" dirty="0"/>
+              <a:t>Focus on application code</a:t>
+            </a:r>
+          </a:p>
+          <a:p>
+            <a:r>
+              <a:rPr lang="en-US" dirty="0"/>
+              <a:t>Easy and quick deployment; no lengthy exchanges with </a:t>
+            </a:r>
+            <a:r>
+              <a:rPr lang="en-US" dirty="0" smtClean="0"/>
+              <a:t>Ops</a:t>
+            </a:r>
+            <a:endParaRPr lang="en-US" dirty="0"/>
+          </a:p>
+          <a:p>
+            <a:r>
+              <a:rPr lang="en-US" dirty="0"/>
+              <a:t>Greater control over deployment</a:t>
+            </a:r>
+          </a:p>
+          <a:p>
+            <a:r>
+              <a:rPr lang="en-US" dirty="0"/>
+              <a:t>Quick and timely updates to production</a:t>
+            </a:r>
+          </a:p>
+          <a:p>
+            <a:r>
+              <a:rPr lang="en-US" dirty="0"/>
+              <a:t>Creating applications that are optimized for the cloud</a:t>
+            </a:r>
+            <a:endParaRPr lang="en-US" dirty="0" smtClean="0"/>
+          </a:p>
+        </p:txBody>
+      </p:sp>
+    </p:spTree>
+    <p:extLst>
+      <p:ext uri="{BB962C8B-B14F-4D97-AF65-F5344CB8AC3E}">
+        <p14:creationId xmlns:p14="http://schemas.microsoft.com/office/powerpoint/2010/main" val="3307001793"/>
+      </p:ext>
+    </p:extLst>
+  </p:cSld>
+  <p:clrMapOvr>
+    <a:masterClrMapping/>
+  </p:clrMapOvr>
+  <p:timing>
+    <p:tnLst>
+      <p:par>
+        <p:cTn xmlns:p14="http://schemas.microsoft.com/office/powerpoint/2010/main" id="1" dur="indefinite" restart="never" nodeType="tmRoot"/>
+      </p:par>
+    </p:tnLst>
+  </p:timing>
+</p:sld>
+</file>
+
+<file path=ppt/slides/slide6.xml><?xml version="1.0" encoding="utf-8"?>
+<p:sld xmlns:a="http://schemas.openxmlformats.org/drawingml/2006/main" xmlns:r="http://schemas.openxmlformats.org/officeDocument/2006/relationships" xmlns:p="http://schemas.openxmlformats.org/presentationml/2006/main">
+  <p:cSld>
+    <p:spTree>
+      <p:nvGrpSpPr>
+        <p:cNvPr id="1" name=""/>
+        <p:cNvGrpSpPr/>
+        <p:nvPr/>
+      </p:nvGrpSpPr>
+      <p:grpSpPr>
+        <a:xfrm>
+          <a:off x="0" y="0"/>
+          <a:ext cx="0" cy="0"/>
+          <a:chOff x="0" y="0"/>
+          <a:chExt cx="0" cy="0"/>
+        </a:xfrm>
+      </p:grpSpPr>
+      <p:sp>
+        <p:nvSpPr>
+          <p:cNvPr id="2" name="Title 1"/>
+          <p:cNvSpPr>
+            <a:spLocks noGrp="1"/>
+          </p:cNvSpPr>
+          <p:nvPr>
+            <p:ph type="title"/>
+          </p:nvPr>
+        </p:nvSpPr>
+        <p:spPr/>
+        <p:txBody>
+          <a:bodyPr/>
+          <a:lstStyle/>
+          <a:p>
+            <a:r>
+              <a:rPr lang="en-US" dirty="0" smtClean="0"/>
+              <a:t>Workshop, Outcomes</a:t>
+            </a:r>
+            <a:endParaRPr lang="en-US" dirty="0"/>
+          </a:p>
+        </p:txBody>
+      </p:sp>
+      <p:sp>
+        <p:nvSpPr>
+          <p:cNvPr id="3" name="Content Placeholder 2"/>
+          <p:cNvSpPr>
+            <a:spLocks noGrp="1"/>
+          </p:cNvSpPr>
+          <p:nvPr>
+            <p:ph sz="quarter" idx="10"/>
+          </p:nvPr>
+        </p:nvSpPr>
+        <p:spPr/>
+        <p:txBody>
+          <a:bodyPr>
+            <a:normAutofit/>
+          </a:bodyPr>
+          <a:lstStyle/>
+          <a:p>
+            <a:r>
+              <a:rPr lang="en-US" dirty="0"/>
+              <a:t>Comfort with </a:t>
+            </a:r>
+            <a:r>
+              <a:rPr lang="en-US" dirty="0" err="1"/>
+              <a:t>cf</a:t>
+            </a:r>
+            <a:r>
+              <a:rPr lang="en-US" dirty="0"/>
+              <a:t> </a:t>
+            </a:r>
+            <a:r>
+              <a:rPr lang="en-US" dirty="0" smtClean="0"/>
+              <a:t>CLI &amp; deploying </a:t>
+            </a:r>
+            <a:r>
+              <a:rPr lang="en-US" dirty="0"/>
+              <a:t>to </a:t>
+            </a:r>
+            <a:r>
+              <a:rPr lang="en-US" dirty="0" smtClean="0"/>
+              <a:t>PCF</a:t>
+            </a:r>
+            <a:endParaRPr lang="en-US" dirty="0"/>
+          </a:p>
+          <a:p>
+            <a:r>
+              <a:rPr lang="en-US" dirty="0"/>
+              <a:t>Increased familiarity with operations and the platform</a:t>
+            </a:r>
+          </a:p>
+          <a:p>
+            <a:r>
+              <a:rPr lang="en-US" dirty="0"/>
+              <a:t>Ability to configure and provision services</a:t>
+            </a:r>
+          </a:p>
+          <a:p>
+            <a:r>
+              <a:rPr lang="en-US" dirty="0"/>
+              <a:t>Understanding of using PCF for logging and metrics</a:t>
+            </a:r>
+            <a:endParaRPr lang="en-US" dirty="0" smtClean="0"/>
+          </a:p>
+        </p:txBody>
+      </p:sp>
+    </p:spTree>
+    <p:extLst>
+      <p:ext uri="{BB962C8B-B14F-4D97-AF65-F5344CB8AC3E}">
+        <p14:creationId xmlns:p14="http://schemas.microsoft.com/office/powerpoint/2010/main" val="3283786516"/>
+      </p:ext>
+    </p:extLst>
+  </p:cSld>
+  <p:clrMapOvr>
+    <a:masterClrMapping/>
+  </p:clrMapOvr>
+  <p:timing>
+    <p:tnLst>
+      <p:par>
+        <p:cTn xmlns:p14="http://schemas.microsoft.com/office/powerpoint/2010/main" id="1" dur="indefinite" restart="never" nodeType="tmRoot"/>
+      </p:par>
+    </p:tnLst>
+  </p:timing>
+</p:sld>
+</file>
+
+<file path=ppt/slides/slide7.xml><?xml version="1.0" encoding="utf-8"?>
+<p:sld xmlns:a="http://schemas.openxmlformats.org/drawingml/2006/main" xmlns:r="http://schemas.openxmlformats.org/officeDocument/2006/relationships" xmlns:p="http://schemas.openxmlformats.org/presentationml/2006/main">
+  <p:cSld>
+    <p:spTree>
+      <p:nvGrpSpPr>
+        <p:cNvPr id="1" name=""/>
+        <p:cNvGrpSpPr/>
+        <p:nvPr/>
+      </p:nvGrpSpPr>
+      <p:grpSpPr>
+        <a:xfrm>
+          <a:off x="0" y="0"/>
+          <a:ext cx="0" cy="0"/>
+          <a:chOff x="0" y="0"/>
+          <a:chExt cx="0" cy="0"/>
+        </a:xfrm>
+      </p:grpSpPr>
+      <p:sp>
+        <p:nvSpPr>
+          <p:cNvPr id="2" name="Title 1"/>
+          <p:cNvSpPr>
+            <a:spLocks noGrp="1"/>
+          </p:cNvSpPr>
+          <p:nvPr>
+            <p:ph type="title"/>
+          </p:nvPr>
+        </p:nvSpPr>
+        <p:spPr/>
+        <p:txBody>
+          <a:bodyPr/>
+          <a:lstStyle/>
+          <a:p>
+            <a:r>
+              <a:rPr lang="en-US" dirty="0" smtClean="0"/>
               <a:t>Agenda</a:t>
             </a:r>
             <a:endParaRPr lang="en-US" dirty="0">
@@ -8766,7 +9006,7 @@
 </p:sld>
 </file>
 
-<file path=ppt/slides/slide6.xml><?xml version="1.0" encoding="utf-8"?>
+<file path=ppt/slides/slide8.xml><?xml version="1.0" encoding="utf-8"?>
 <p:sld xmlns:a="http://schemas.openxmlformats.org/drawingml/2006/main" xmlns:r="http://schemas.openxmlformats.org/officeDocument/2006/relationships" xmlns:p="http://schemas.openxmlformats.org/presentationml/2006/main">
   <p:cSld>
     <p:spTree>
@@ -9143,7 +9383,7 @@
 </p:sld>
 </file>
 
-<file path=ppt/slides/slide7.xml><?xml version="1.0" encoding="utf-8"?>
+<file path=ppt/slides/slide9.xml><?xml version="1.0" encoding="utf-8"?>
 <p:sld xmlns:a="http://schemas.openxmlformats.org/drawingml/2006/main" xmlns:r="http://schemas.openxmlformats.org/officeDocument/2006/relationships" xmlns:p="http://schemas.openxmlformats.org/presentationml/2006/main">
   <p:cSld>
     <p:spTree>

</xml_diff>